<commit_message>
PPT 2 Slides Added
</commit_message>
<xml_diff>
--- a/Gramener_Case_Study_Presentation_SS.pptx
+++ b/Gramener_Case_Study_Presentation_SS.pptx
@@ -298,1029 +298,6 @@
           <a:latin typeface="Times New Roman" panose="02020603050405020304" pitchFamily="18" charset="0"/>
           <a:cs typeface="Times New Roman" panose="02020603050405020304" pitchFamily="18" charset="0"/>
         </a:defRPr>
-      </a:pPr>
-      <a:endParaRPr lang="en-US"/>
-    </a:p>
-  </c:txPr>
-  <c:externalData r:id="rId1">
-    <c:autoUpdate val="0"/>
-  </c:externalData>
-</c:chartSpace>
-</file>
-
-<file path=ppt/charts/chart10.xml><?xml version="1.0" encoding="utf-8"?>
-<c:chartSpace xmlns:c="http://schemas.openxmlformats.org/drawingml/2006/chart" xmlns:a="http://schemas.openxmlformats.org/drawingml/2006/main" xmlns:r="http://schemas.openxmlformats.org/officeDocument/2006/relationships">
-  <c:date1904 val="0"/>
-  <c:lang val="en-US"/>
-  <c:roundedCorners val="0"/>
-  <mc:AlternateContent xmlns:mc="http://schemas.openxmlformats.org/markup-compatibility/2006">
-    <mc:Choice xmlns:c14="http://schemas.microsoft.com/office/drawing/2007/8/2/chart" Requires="c14">
-      <c14:style val="102"/>
-    </mc:Choice>
-    <mc:Fallback>
-      <c:style val="2"/>
-    </mc:Fallback>
-  </mc:AlternateContent>
-  <c:chart>
-    <c:autoTitleDeleted val="1"/>
-    <c:plotArea>
-      <c:layout>
-        <c:manualLayout>
-          <c:layoutTarget val="inner"/>
-          <c:xMode val="edge"/>
-          <c:yMode val="edge"/>
-          <c:x val="8.8890338912460384E-2"/>
-          <c:y val="0.12205713369006782"/>
-          <c:w val="0.90913412967255003"/>
-          <c:h val="0.45454358137332351"/>
-        </c:manualLayout>
-      </c:layout>
-      <c:barChart>
-        <c:barDir val="col"/>
-        <c:grouping val="stacked"/>
-        <c:varyColors val="0"/>
-        <c:ser>
-          <c:idx val="0"/>
-          <c:order val="0"/>
-          <c:tx>
-            <c:strRef>
-              <c:f>Sheet1!$B$1</c:f>
-              <c:strCache>
-                <c:ptCount val="1"/>
-                <c:pt idx="0">
-                  <c:v>36 Months</c:v>
-                </c:pt>
-              </c:strCache>
-            </c:strRef>
-          </c:tx>
-          <c:spPr>
-            <a:solidFill>
-              <a:schemeClr val="tx2">
-                <a:lumMod val="60000"/>
-                <a:lumOff val="40000"/>
-              </a:schemeClr>
-            </a:solidFill>
-          </c:spPr>
-          <c:invertIfNegative val="0"/>
-          <c:dLbls>
-            <c:delete val="1"/>
-          </c:dLbls>
-          <c:cat>
-            <c:strRef>
-              <c:f>Sheet1!$A$2:$A$8</c:f>
-              <c:strCache>
-                <c:ptCount val="7"/>
-                <c:pt idx="0">
-                  <c:v>credit_card</c:v>
-                </c:pt>
-                <c:pt idx="1">
-                  <c:v>debt_consolidation</c:v>
-                </c:pt>
-                <c:pt idx="2">
-                  <c:v>home_improvement</c:v>
-                </c:pt>
-                <c:pt idx="3">
-                  <c:v>major_purchase</c:v>
-                </c:pt>
-                <c:pt idx="4">
-                  <c:v>other</c:v>
-                </c:pt>
-                <c:pt idx="5">
-                  <c:v>small_business</c:v>
-                </c:pt>
-                <c:pt idx="6">
-                  <c:v>other purpose</c:v>
-                </c:pt>
-              </c:strCache>
-            </c:strRef>
-          </c:cat>
-          <c:val>
-            <c:numRef>
-              <c:f>Sheet1!$B$2:$B$8</c:f>
-              <c:numCache>
-                <c:formatCode>General</c:formatCode>
-                <c:ptCount val="7"/>
-                <c:pt idx="0">
-                  <c:v>3773</c:v>
-                </c:pt>
-                <c:pt idx="1">
-                  <c:v>11662</c:v>
-                </c:pt>
-                <c:pt idx="2">
-                  <c:v>1874</c:v>
-                </c:pt>
-                <c:pt idx="3">
-                  <c:v>1587</c:v>
-                </c:pt>
-                <c:pt idx="4">
-                  <c:v>2724</c:v>
-                </c:pt>
-                <c:pt idx="5">
-                  <c:v>970</c:v>
-                </c:pt>
-                <c:pt idx="6">
-                  <c:v>3279</c:v>
-                </c:pt>
-              </c:numCache>
-            </c:numRef>
-          </c:val>
-        </c:ser>
-        <c:ser>
-          <c:idx val="1"/>
-          <c:order val="1"/>
-          <c:tx>
-            <c:strRef>
-              <c:f>Sheet1!$C$1</c:f>
-              <c:strCache>
-                <c:ptCount val="1"/>
-                <c:pt idx="0">
-                  <c:v>60 Months</c:v>
-                </c:pt>
-              </c:strCache>
-            </c:strRef>
-          </c:tx>
-          <c:spPr>
-            <a:solidFill>
-              <a:schemeClr val="tx2"/>
-            </a:solidFill>
-          </c:spPr>
-          <c:invertIfNegative val="0"/>
-          <c:dLbls>
-            <c:delete val="1"/>
-          </c:dLbls>
-          <c:cat>
-            <c:strRef>
-              <c:f>Sheet1!$A$2:$A$8</c:f>
-              <c:strCache>
-                <c:ptCount val="7"/>
-                <c:pt idx="0">
-                  <c:v>credit_card</c:v>
-                </c:pt>
-                <c:pt idx="1">
-                  <c:v>debt_consolidation</c:v>
-                </c:pt>
-                <c:pt idx="2">
-                  <c:v>home_improvement</c:v>
-                </c:pt>
-                <c:pt idx="3">
-                  <c:v>major_purchase</c:v>
-                </c:pt>
-                <c:pt idx="4">
-                  <c:v>other</c:v>
-                </c:pt>
-                <c:pt idx="5">
-                  <c:v>small_business</c:v>
-                </c:pt>
-                <c:pt idx="6">
-                  <c:v>other purpose</c:v>
-                </c:pt>
-              </c:strCache>
-            </c:strRef>
-          </c:cat>
-          <c:val>
-            <c:numRef>
-              <c:f>Sheet1!$C$2:$C$8</c:f>
-              <c:numCache>
-                <c:formatCode>General</c:formatCode>
-                <c:ptCount val="7"/>
-                <c:pt idx="0">
-                  <c:v>712</c:v>
-                </c:pt>
-                <c:pt idx="1">
-                  <c:v>3626</c:v>
-                </c:pt>
-                <c:pt idx="2">
-                  <c:v>654</c:v>
-                </c:pt>
-                <c:pt idx="3">
-                  <c:v>341</c:v>
-                </c:pt>
-                <c:pt idx="4">
-                  <c:v>508</c:v>
-                </c:pt>
-                <c:pt idx="5">
-                  <c:v>309</c:v>
-                </c:pt>
-                <c:pt idx="6">
-                  <c:v>931</c:v>
-                </c:pt>
-              </c:numCache>
-            </c:numRef>
-          </c:val>
-        </c:ser>
-        <c:dLbls>
-          <c:showLegendKey val="0"/>
-          <c:showVal val="1"/>
-          <c:showCatName val="0"/>
-          <c:showSerName val="0"/>
-          <c:showPercent val="0"/>
-          <c:showBubbleSize val="0"/>
-        </c:dLbls>
-        <c:gapWidth val="95"/>
-        <c:overlap val="100"/>
-        <c:axId val="50717056"/>
-        <c:axId val="50718592"/>
-      </c:barChart>
-      <c:catAx>
-        <c:axId val="50717056"/>
-        <c:scaling>
-          <c:orientation val="minMax"/>
-        </c:scaling>
-        <c:delete val="0"/>
-        <c:axPos val="b"/>
-        <c:majorTickMark val="none"/>
-        <c:minorTickMark val="none"/>
-        <c:tickLblPos val="none"/>
-        <c:txPr>
-          <a:bodyPr/>
-          <a:lstStyle/>
-          <a:p>
-            <a:pPr>
-              <a:defRPr sz="700"/>
-            </a:pPr>
-            <a:endParaRPr lang="en-US"/>
-          </a:p>
-        </c:txPr>
-        <c:crossAx val="50718592"/>
-        <c:crosses val="autoZero"/>
-        <c:auto val="1"/>
-        <c:lblAlgn val="ctr"/>
-        <c:lblOffset val="100"/>
-        <c:noMultiLvlLbl val="0"/>
-      </c:catAx>
-      <c:valAx>
-        <c:axId val="50718592"/>
-        <c:scaling>
-          <c:orientation val="minMax"/>
-        </c:scaling>
-        <c:delete val="1"/>
-        <c:axPos val="l"/>
-        <c:numFmt formatCode="General" sourceLinked="1"/>
-        <c:majorTickMark val="out"/>
-        <c:minorTickMark val="none"/>
-        <c:tickLblPos val="nextTo"/>
-        <c:crossAx val="50717056"/>
-        <c:crosses val="autoZero"/>
-        <c:crossBetween val="between"/>
-      </c:valAx>
-      <c:spPr>
-        <a:noFill/>
-        <a:ln w="25400">
-          <a:noFill/>
-        </a:ln>
-      </c:spPr>
-    </c:plotArea>
-    <c:plotVisOnly val="1"/>
-    <c:dispBlanksAs val="gap"/>
-    <c:showDLblsOverMax val="0"/>
-  </c:chart>
-  <c:txPr>
-    <a:bodyPr/>
-    <a:lstStyle/>
-    <a:p>
-      <a:pPr>
-        <a:defRPr sz="1800"/>
-      </a:pPr>
-      <a:endParaRPr lang="en-US"/>
-    </a:p>
-  </c:txPr>
-  <c:externalData r:id="rId1">
-    <c:autoUpdate val="0"/>
-  </c:externalData>
-</c:chartSpace>
-</file>
-
-<file path=ppt/charts/chart11.xml><?xml version="1.0" encoding="utf-8"?>
-<c:chartSpace xmlns:c="http://schemas.openxmlformats.org/drawingml/2006/chart" xmlns:a="http://schemas.openxmlformats.org/drawingml/2006/main" xmlns:r="http://schemas.openxmlformats.org/officeDocument/2006/relationships">
-  <c:date1904 val="0"/>
-  <c:lang val="en-US"/>
-  <c:roundedCorners val="0"/>
-  <mc:AlternateContent xmlns:mc="http://schemas.openxmlformats.org/markup-compatibility/2006">
-    <mc:Choice xmlns:c14="http://schemas.microsoft.com/office/drawing/2007/8/2/chart" Requires="c14">
-      <c14:style val="102"/>
-    </mc:Choice>
-    <mc:Fallback>
-      <c:style val="2"/>
-    </mc:Fallback>
-  </mc:AlternateContent>
-  <c:chart>
-    <c:autoTitleDeleted val="1"/>
-    <c:plotArea>
-      <c:layout>
-        <c:manualLayout>
-          <c:layoutTarget val="inner"/>
-          <c:xMode val="edge"/>
-          <c:yMode val="edge"/>
-          <c:x val="8.8890338912460384E-2"/>
-          <c:y val="0.12205713369006782"/>
-          <c:w val="0.90913412967255003"/>
-          <c:h val="0.3577692973344706"/>
-        </c:manualLayout>
-      </c:layout>
-      <c:barChart>
-        <c:barDir val="col"/>
-        <c:grouping val="stacked"/>
-        <c:varyColors val="0"/>
-        <c:ser>
-          <c:idx val="0"/>
-          <c:order val="0"/>
-          <c:tx>
-            <c:strRef>
-              <c:f>Sheet1!$B$1</c:f>
-              <c:strCache>
-                <c:ptCount val="1"/>
-                <c:pt idx="0">
-                  <c:v>36 Months</c:v>
-                </c:pt>
-              </c:strCache>
-            </c:strRef>
-          </c:tx>
-          <c:spPr>
-            <a:solidFill>
-              <a:schemeClr val="accent4">
-                <a:lumMod val="40000"/>
-                <a:lumOff val="60000"/>
-              </a:schemeClr>
-            </a:solidFill>
-          </c:spPr>
-          <c:invertIfNegative val="0"/>
-          <c:dLbls>
-            <c:delete val="1"/>
-          </c:dLbls>
-          <c:cat>
-            <c:strRef>
-              <c:f>Sheet1!$A$2:$A$8</c:f>
-              <c:strCache>
-                <c:ptCount val="7"/>
-                <c:pt idx="0">
-                  <c:v>credit_card</c:v>
-                </c:pt>
-                <c:pt idx="1">
-                  <c:v>debt_consolidation</c:v>
-                </c:pt>
-                <c:pt idx="2">
-                  <c:v>home_improvement</c:v>
-                </c:pt>
-                <c:pt idx="3">
-                  <c:v>major_purchase</c:v>
-                </c:pt>
-                <c:pt idx="4">
-                  <c:v>other</c:v>
-                </c:pt>
-                <c:pt idx="5">
-                  <c:v>other purpose</c:v>
-                </c:pt>
-                <c:pt idx="6">
-                  <c:v>small_business</c:v>
-                </c:pt>
-              </c:strCache>
-            </c:strRef>
-          </c:cat>
-          <c:val>
-            <c:numRef>
-              <c:f>Sheet1!$B$2:$B$8</c:f>
-              <c:numCache>
-                <c:formatCode>General</c:formatCode>
-                <c:ptCount val="7"/>
-                <c:pt idx="0">
-                  <c:v>318</c:v>
-                </c:pt>
-                <c:pt idx="1">
-                  <c:v>1469</c:v>
-                </c:pt>
-                <c:pt idx="2">
-                  <c:v>205</c:v>
-                </c:pt>
-                <c:pt idx="3">
-                  <c:v>137</c:v>
-                </c:pt>
-                <c:pt idx="4">
-                  <c:v>414</c:v>
-                </c:pt>
-                <c:pt idx="5">
-                  <c:v>415</c:v>
-                </c:pt>
-                <c:pt idx="6">
-                  <c:v>269</c:v>
-                </c:pt>
-              </c:numCache>
-            </c:numRef>
-          </c:val>
-        </c:ser>
-        <c:ser>
-          <c:idx val="1"/>
-          <c:order val="1"/>
-          <c:tx>
-            <c:strRef>
-              <c:f>Sheet1!$C$1</c:f>
-              <c:strCache>
-                <c:ptCount val="1"/>
-                <c:pt idx="0">
-                  <c:v>60 Months</c:v>
-                </c:pt>
-              </c:strCache>
-            </c:strRef>
-          </c:tx>
-          <c:spPr>
-            <a:solidFill>
-              <a:schemeClr val="accent4"/>
-            </a:solidFill>
-          </c:spPr>
-          <c:invertIfNegative val="0"/>
-          <c:dLbls>
-            <c:delete val="1"/>
-          </c:dLbls>
-          <c:cat>
-            <c:strRef>
-              <c:f>Sheet1!$A$2:$A$8</c:f>
-              <c:strCache>
-                <c:ptCount val="7"/>
-                <c:pt idx="0">
-                  <c:v>credit_card</c:v>
-                </c:pt>
-                <c:pt idx="1">
-                  <c:v>debt_consolidation</c:v>
-                </c:pt>
-                <c:pt idx="2">
-                  <c:v>home_improvement</c:v>
-                </c:pt>
-                <c:pt idx="3">
-                  <c:v>major_purchase</c:v>
-                </c:pt>
-                <c:pt idx="4">
-                  <c:v>other</c:v>
-                </c:pt>
-                <c:pt idx="5">
-                  <c:v>other purpose</c:v>
-                </c:pt>
-                <c:pt idx="6">
-                  <c:v>small_business</c:v>
-                </c:pt>
-              </c:strCache>
-            </c:strRef>
-          </c:cat>
-          <c:val>
-            <c:numRef>
-              <c:f>Sheet1!$C$2:$C$8</c:f>
-              <c:numCache>
-                <c:formatCode>General</c:formatCode>
-                <c:ptCount val="7"/>
-                <c:pt idx="0">
-                  <c:v>224</c:v>
-                </c:pt>
-                <c:pt idx="1">
-                  <c:v>1298</c:v>
-                </c:pt>
-                <c:pt idx="2">
-                  <c:v>142</c:v>
-                </c:pt>
-                <c:pt idx="3">
-                  <c:v>85</c:v>
-                </c:pt>
-                <c:pt idx="4">
-                  <c:v>219</c:v>
-                </c:pt>
-                <c:pt idx="5">
-                  <c:v>226</c:v>
-                </c:pt>
-                <c:pt idx="6">
-                  <c:v>206</c:v>
-                </c:pt>
-              </c:numCache>
-            </c:numRef>
-          </c:val>
-        </c:ser>
-        <c:dLbls>
-          <c:showLegendKey val="0"/>
-          <c:showVal val="1"/>
-          <c:showCatName val="0"/>
-          <c:showSerName val="0"/>
-          <c:showPercent val="0"/>
-          <c:showBubbleSize val="0"/>
-        </c:dLbls>
-        <c:gapWidth val="95"/>
-        <c:overlap val="100"/>
-        <c:axId val="50796416"/>
-        <c:axId val="50797952"/>
-      </c:barChart>
-      <c:catAx>
-        <c:axId val="50796416"/>
-        <c:scaling>
-          <c:orientation val="minMax"/>
-        </c:scaling>
-        <c:delete val="0"/>
-        <c:axPos val="b"/>
-        <c:numFmt formatCode="General" sourceLinked="1"/>
-        <c:majorTickMark val="none"/>
-        <c:minorTickMark val="none"/>
-        <c:tickLblPos val="none"/>
-        <c:crossAx val="50797952"/>
-        <c:crosses val="autoZero"/>
-        <c:auto val="1"/>
-        <c:lblAlgn val="ctr"/>
-        <c:lblOffset val="100"/>
-        <c:noMultiLvlLbl val="0"/>
-      </c:catAx>
-      <c:valAx>
-        <c:axId val="50797952"/>
-        <c:scaling>
-          <c:orientation val="minMax"/>
-        </c:scaling>
-        <c:delete val="1"/>
-        <c:axPos val="l"/>
-        <c:numFmt formatCode="General" sourceLinked="1"/>
-        <c:majorTickMark val="out"/>
-        <c:minorTickMark val="none"/>
-        <c:tickLblPos val="nextTo"/>
-        <c:crossAx val="50796416"/>
-        <c:crosses val="autoZero"/>
-        <c:crossBetween val="between"/>
-      </c:valAx>
-      <c:spPr>
-        <a:noFill/>
-        <a:ln w="25400">
-          <a:noFill/>
-        </a:ln>
-      </c:spPr>
-    </c:plotArea>
-    <c:plotVisOnly val="1"/>
-    <c:dispBlanksAs val="gap"/>
-    <c:showDLblsOverMax val="0"/>
-  </c:chart>
-  <c:txPr>
-    <a:bodyPr/>
-    <a:lstStyle/>
-    <a:p>
-      <a:pPr>
-        <a:defRPr sz="1800"/>
-      </a:pPr>
-      <a:endParaRPr lang="en-US"/>
-    </a:p>
-  </c:txPr>
-  <c:externalData r:id="rId1">
-    <c:autoUpdate val="0"/>
-  </c:externalData>
-</c:chartSpace>
-</file>
-
-<file path=ppt/charts/chart12.xml><?xml version="1.0" encoding="utf-8"?>
-<c:chartSpace xmlns:c="http://schemas.openxmlformats.org/drawingml/2006/chart" xmlns:a="http://schemas.openxmlformats.org/drawingml/2006/main" xmlns:r="http://schemas.openxmlformats.org/officeDocument/2006/relationships">
-  <c:date1904 val="0"/>
-  <c:lang val="en-US"/>
-  <c:roundedCorners val="0"/>
-  <mc:AlternateContent xmlns:mc="http://schemas.openxmlformats.org/markup-compatibility/2006">
-    <mc:Choice xmlns:c14="http://schemas.microsoft.com/office/drawing/2007/8/2/chart" Requires="c14">
-      <c14:style val="102"/>
-    </mc:Choice>
-    <mc:Fallback>
-      <c:style val="2"/>
-    </mc:Fallback>
-  </mc:AlternateContent>
-  <c:chart>
-    <c:autoTitleDeleted val="1"/>
-    <c:plotArea>
-      <c:layout>
-        <c:manualLayout>
-          <c:layoutTarget val="inner"/>
-          <c:xMode val="edge"/>
-          <c:yMode val="edge"/>
-          <c:x val="8.8890338912460384E-2"/>
-          <c:y val="0.12205713369006782"/>
-          <c:w val="0.90913412967255003"/>
-          <c:h val="0.70268607301478148"/>
-        </c:manualLayout>
-      </c:layout>
-      <c:barChart>
-        <c:barDir val="col"/>
-        <c:grouping val="stacked"/>
-        <c:varyColors val="0"/>
-        <c:ser>
-          <c:idx val="0"/>
-          <c:order val="0"/>
-          <c:tx>
-            <c:strRef>
-              <c:f>Sheet1!$B$1</c:f>
-              <c:strCache>
-                <c:ptCount val="1"/>
-                <c:pt idx="0">
-                  <c:v> 36 months</c:v>
-                </c:pt>
-              </c:strCache>
-            </c:strRef>
-          </c:tx>
-          <c:spPr>
-            <a:solidFill>
-              <a:schemeClr val="accent4">
-                <a:lumMod val="40000"/>
-                <a:lumOff val="60000"/>
-              </a:schemeClr>
-            </a:solidFill>
-          </c:spPr>
-          <c:invertIfNegative val="0"/>
-          <c:dLbls>
-            <c:delete val="1"/>
-          </c:dLbls>
-          <c:cat>
-            <c:strRef>
-              <c:f>Sheet1!$A$2:$A$4</c:f>
-              <c:strCache>
-                <c:ptCount val="3"/>
-                <c:pt idx="0">
-                  <c:v>Not Verified</c:v>
-                </c:pt>
-                <c:pt idx="1">
-                  <c:v>Source Verified</c:v>
-                </c:pt>
-                <c:pt idx="2">
-                  <c:v>Verified</c:v>
-                </c:pt>
-              </c:strCache>
-            </c:strRef>
-          </c:cat>
-          <c:val>
-            <c:numRef>
-              <c:f>Sheet1!$B$2:$B$4</c:f>
-              <c:numCache>
-                <c:formatCode>General</c:formatCode>
-                <c:ptCount val="3"/>
-                <c:pt idx="0">
-                  <c:v>1652</c:v>
-                </c:pt>
-                <c:pt idx="1">
-                  <c:v>715</c:v>
-                </c:pt>
-                <c:pt idx="2">
-                  <c:v>860</c:v>
-                </c:pt>
-              </c:numCache>
-            </c:numRef>
-          </c:val>
-        </c:ser>
-        <c:ser>
-          <c:idx val="1"/>
-          <c:order val="1"/>
-          <c:tx>
-            <c:strRef>
-              <c:f>Sheet1!$C$1</c:f>
-              <c:strCache>
-                <c:ptCount val="1"/>
-                <c:pt idx="0">
-                  <c:v> 60 months</c:v>
-                </c:pt>
-              </c:strCache>
-            </c:strRef>
-          </c:tx>
-          <c:spPr>
-            <a:solidFill>
-              <a:schemeClr val="accent4"/>
-            </a:solidFill>
-          </c:spPr>
-          <c:invertIfNegative val="0"/>
-          <c:dLbls>
-            <c:delete val="1"/>
-          </c:dLbls>
-          <c:cat>
-            <c:strRef>
-              <c:f>Sheet1!$A$2:$A$4</c:f>
-              <c:strCache>
-                <c:ptCount val="3"/>
-                <c:pt idx="0">
-                  <c:v>Not Verified</c:v>
-                </c:pt>
-                <c:pt idx="1">
-                  <c:v>Source Verified</c:v>
-                </c:pt>
-                <c:pt idx="2">
-                  <c:v>Verified</c:v>
-                </c:pt>
-              </c:strCache>
-            </c:strRef>
-          </c:cat>
-          <c:val>
-            <c:numRef>
-              <c:f>Sheet1!$C$2:$C$4</c:f>
-              <c:numCache>
-                <c:formatCode>General</c:formatCode>
-                <c:ptCount val="3"/>
-                <c:pt idx="0">
-                  <c:v>490</c:v>
-                </c:pt>
-                <c:pt idx="1">
-                  <c:v>719</c:v>
-                </c:pt>
-                <c:pt idx="2">
-                  <c:v>1191</c:v>
-                </c:pt>
-              </c:numCache>
-            </c:numRef>
-          </c:val>
-        </c:ser>
-        <c:dLbls>
-          <c:showLegendKey val="0"/>
-          <c:showVal val="1"/>
-          <c:showCatName val="0"/>
-          <c:showSerName val="0"/>
-          <c:showPercent val="0"/>
-          <c:showBubbleSize val="0"/>
-        </c:dLbls>
-        <c:gapWidth val="95"/>
-        <c:overlap val="100"/>
-        <c:axId val="50870912"/>
-        <c:axId val="50880896"/>
-      </c:barChart>
-      <c:catAx>
-        <c:axId val="50870912"/>
-        <c:scaling>
-          <c:orientation val="minMax"/>
-        </c:scaling>
-        <c:delete val="0"/>
-        <c:axPos val="b"/>
-        <c:majorTickMark val="none"/>
-        <c:minorTickMark val="none"/>
-        <c:tickLblPos val="none"/>
-        <c:txPr>
-          <a:bodyPr/>
-          <a:lstStyle/>
-          <a:p>
-            <a:pPr>
-              <a:defRPr sz="700"/>
-            </a:pPr>
-            <a:endParaRPr lang="en-US"/>
-          </a:p>
-        </c:txPr>
-        <c:crossAx val="50880896"/>
-        <c:crosses val="autoZero"/>
-        <c:auto val="1"/>
-        <c:lblAlgn val="ctr"/>
-        <c:lblOffset val="100"/>
-        <c:noMultiLvlLbl val="0"/>
-      </c:catAx>
-      <c:valAx>
-        <c:axId val="50880896"/>
-        <c:scaling>
-          <c:orientation val="minMax"/>
-        </c:scaling>
-        <c:delete val="1"/>
-        <c:axPos val="l"/>
-        <c:numFmt formatCode="General" sourceLinked="1"/>
-        <c:majorTickMark val="out"/>
-        <c:minorTickMark val="none"/>
-        <c:tickLblPos val="nextTo"/>
-        <c:crossAx val="50870912"/>
-        <c:crosses val="autoZero"/>
-        <c:crossBetween val="between"/>
-      </c:valAx>
-      <c:spPr>
-        <a:noFill/>
-        <a:ln w="25400">
-          <a:noFill/>
-        </a:ln>
-      </c:spPr>
-    </c:plotArea>
-    <c:plotVisOnly val="1"/>
-    <c:dispBlanksAs val="gap"/>
-    <c:showDLblsOverMax val="0"/>
-  </c:chart>
-  <c:txPr>
-    <a:bodyPr/>
-    <a:lstStyle/>
-    <a:p>
-      <a:pPr>
-        <a:defRPr sz="1800"/>
-      </a:pPr>
-      <a:endParaRPr lang="en-US"/>
-    </a:p>
-  </c:txPr>
-  <c:externalData r:id="rId1">
-    <c:autoUpdate val="0"/>
-  </c:externalData>
-</c:chartSpace>
-</file>
-
-<file path=ppt/charts/chart13.xml><?xml version="1.0" encoding="utf-8"?>
-<c:chartSpace xmlns:c="http://schemas.openxmlformats.org/drawingml/2006/chart" xmlns:a="http://schemas.openxmlformats.org/drawingml/2006/main" xmlns:r="http://schemas.openxmlformats.org/officeDocument/2006/relationships">
-  <c:date1904 val="0"/>
-  <c:lang val="en-US"/>
-  <c:roundedCorners val="0"/>
-  <mc:AlternateContent xmlns:mc="http://schemas.openxmlformats.org/markup-compatibility/2006">
-    <mc:Choice xmlns:c14="http://schemas.microsoft.com/office/drawing/2007/8/2/chart" Requires="c14">
-      <c14:style val="102"/>
-    </mc:Choice>
-    <mc:Fallback>
-      <c:style val="2"/>
-    </mc:Fallback>
-  </mc:AlternateContent>
-  <c:chart>
-    <c:autoTitleDeleted val="1"/>
-    <c:plotArea>
-      <c:layout>
-        <c:manualLayout>
-          <c:layoutTarget val="inner"/>
-          <c:xMode val="edge"/>
-          <c:yMode val="edge"/>
-          <c:x val="8.8890338912460384E-2"/>
-          <c:y val="6.3723728681869402E-2"/>
-          <c:w val="0.90913412967255003"/>
-          <c:h val="0.90202279437473287"/>
-        </c:manualLayout>
-      </c:layout>
-      <c:barChart>
-        <c:barDir val="col"/>
-        <c:grouping val="stacked"/>
-        <c:varyColors val="0"/>
-        <c:ser>
-          <c:idx val="0"/>
-          <c:order val="0"/>
-          <c:tx>
-            <c:strRef>
-              <c:f>Sheet1!$B$1</c:f>
-              <c:strCache>
-                <c:ptCount val="1"/>
-                <c:pt idx="0">
-                  <c:v> 36 months</c:v>
-                </c:pt>
-              </c:strCache>
-            </c:strRef>
-          </c:tx>
-          <c:spPr>
-            <a:solidFill>
-              <a:schemeClr val="tx2">
-                <a:lumMod val="40000"/>
-                <a:lumOff val="60000"/>
-              </a:schemeClr>
-            </a:solidFill>
-          </c:spPr>
-          <c:invertIfNegative val="0"/>
-          <c:dLbls>
-            <c:delete val="1"/>
-          </c:dLbls>
-          <c:cat>
-            <c:strRef>
-              <c:f>Sheet1!$A$2:$A$4</c:f>
-              <c:strCache>
-                <c:ptCount val="3"/>
-                <c:pt idx="0">
-                  <c:v>Not Verified</c:v>
-                </c:pt>
-                <c:pt idx="1">
-                  <c:v>Source Verified</c:v>
-                </c:pt>
-                <c:pt idx="2">
-                  <c:v>Verified</c:v>
-                </c:pt>
-              </c:strCache>
-            </c:strRef>
-          </c:cat>
-          <c:val>
-            <c:numRef>
-              <c:f>Sheet1!$B$2:$B$4</c:f>
-              <c:numCache>
-                <c:formatCode>General</c:formatCode>
-                <c:ptCount val="3"/>
-                <c:pt idx="0">
-                  <c:v>12866</c:v>
-                </c:pt>
-                <c:pt idx="1">
-                  <c:v>6245</c:v>
-                </c:pt>
-                <c:pt idx="2">
-                  <c:v>6758</c:v>
-                </c:pt>
-              </c:numCache>
-            </c:numRef>
-          </c:val>
-        </c:ser>
-        <c:ser>
-          <c:idx val="1"/>
-          <c:order val="1"/>
-          <c:tx>
-            <c:strRef>
-              <c:f>Sheet1!$C$1</c:f>
-              <c:strCache>
-                <c:ptCount val="1"/>
-                <c:pt idx="0">
-                  <c:v> 60 months</c:v>
-                </c:pt>
-              </c:strCache>
-            </c:strRef>
-          </c:tx>
-          <c:spPr>
-            <a:solidFill>
-              <a:schemeClr val="tx2"/>
-            </a:solidFill>
-          </c:spPr>
-          <c:invertIfNegative val="0"/>
-          <c:dLbls>
-            <c:delete val="1"/>
-          </c:dLbls>
-          <c:cat>
-            <c:strRef>
-              <c:f>Sheet1!$A$2:$A$4</c:f>
-              <c:strCache>
-                <c:ptCount val="3"/>
-                <c:pt idx="0">
-                  <c:v>Not Verified</c:v>
-                </c:pt>
-                <c:pt idx="1">
-                  <c:v>Source Verified</c:v>
-                </c:pt>
-                <c:pt idx="2">
-                  <c:v>Verified</c:v>
-                </c:pt>
-              </c:strCache>
-            </c:strRef>
-          </c:cat>
-          <c:val>
-            <c:numRef>
-              <c:f>Sheet1!$C$2:$C$4</c:f>
-              <c:numCache>
-                <c:formatCode>General</c:formatCode>
-                <c:ptCount val="3"/>
-                <c:pt idx="0">
-                  <c:v>1686</c:v>
-                </c:pt>
-                <c:pt idx="1">
-                  <c:v>1998</c:v>
-                </c:pt>
-                <c:pt idx="2">
-                  <c:v>3397</c:v>
-                </c:pt>
-              </c:numCache>
-            </c:numRef>
-          </c:val>
-        </c:ser>
-        <c:dLbls>
-          <c:showLegendKey val="0"/>
-          <c:showVal val="1"/>
-          <c:showCatName val="0"/>
-          <c:showSerName val="0"/>
-          <c:showPercent val="0"/>
-          <c:showBubbleSize val="0"/>
-        </c:dLbls>
-        <c:gapWidth val="95"/>
-        <c:overlap val="100"/>
-        <c:axId val="50844032"/>
-        <c:axId val="50845568"/>
-      </c:barChart>
-      <c:catAx>
-        <c:axId val="50844032"/>
-        <c:scaling>
-          <c:orientation val="minMax"/>
-        </c:scaling>
-        <c:delete val="0"/>
-        <c:axPos val="b"/>
-        <c:majorTickMark val="none"/>
-        <c:minorTickMark val="none"/>
-        <c:tickLblPos val="none"/>
-        <c:txPr>
-          <a:bodyPr/>
-          <a:lstStyle/>
-          <a:p>
-            <a:pPr>
-              <a:defRPr sz="700"/>
-            </a:pPr>
-            <a:endParaRPr lang="en-US"/>
-          </a:p>
-        </c:txPr>
-        <c:crossAx val="50845568"/>
-        <c:crosses val="autoZero"/>
-        <c:auto val="1"/>
-        <c:lblAlgn val="ctr"/>
-        <c:lblOffset val="100"/>
-        <c:noMultiLvlLbl val="0"/>
-      </c:catAx>
-      <c:valAx>
-        <c:axId val="50845568"/>
-        <c:scaling>
-          <c:orientation val="minMax"/>
-        </c:scaling>
-        <c:delete val="1"/>
-        <c:axPos val="l"/>
-        <c:numFmt formatCode="General" sourceLinked="1"/>
-        <c:majorTickMark val="out"/>
-        <c:minorTickMark val="none"/>
-        <c:tickLblPos val="nextTo"/>
-        <c:crossAx val="50844032"/>
-        <c:crosses val="autoZero"/>
-        <c:crossBetween val="between"/>
-      </c:valAx>
-      <c:spPr>
-        <a:noFill/>
-        <a:ln w="25400">
-          <a:noFill/>
-        </a:ln>
-      </c:spPr>
-    </c:plotArea>
-    <c:plotVisOnly val="1"/>
-    <c:dispBlanksAs val="gap"/>
-    <c:showDLblsOverMax val="0"/>
-  </c:chart>
-  <c:txPr>
-    <a:bodyPr/>
-    <a:lstStyle/>
-    <a:p>
-      <a:pPr>
-        <a:defRPr sz="1800"/>
       </a:pPr>
       <a:endParaRPr lang="en-US"/>
     </a:p>
@@ -16261,25 +15238,6 @@
               <a:cs typeface="Times New Roman" panose="02020603050405020304" pitchFamily="18" charset="0"/>
             </a:endParaRPr>
           </a:p>
-          <a:p>
-            <a:r>
-              <a:rPr lang="en-US" sz="1200" dirty="0" smtClean="0">
-                <a:solidFill>
-                  <a:schemeClr val="tx1"/>
-                </a:solidFill>
-                <a:latin typeface="Times New Roman" panose="02020603050405020304" pitchFamily="18" charset="0"/>
-                <a:cs typeface="Times New Roman" panose="02020603050405020304" pitchFamily="18" charset="0"/>
-              </a:rPr>
-              <a:t>”</a:t>
-            </a:r>
-            <a:endParaRPr lang="en-US" sz="1200" dirty="0" smtClean="0">
-              <a:solidFill>
-                <a:schemeClr val="tx1"/>
-              </a:solidFill>
-              <a:latin typeface="Times New Roman" panose="02020603050405020304" pitchFamily="18" charset="0"/>
-              <a:cs typeface="Times New Roman" panose="02020603050405020304" pitchFamily="18" charset="0"/>
-            </a:endParaRPr>
-          </a:p>
         </p:txBody>
       </p:sp>
       <p:sp>
@@ -17317,50 +16275,6 @@
           <a:chExt cx="0" cy="0"/>
         </a:xfrm>
       </p:grpSpPr>
-      <p:graphicFrame>
-        <p:nvGraphicFramePr>
-          <p:cNvPr id="3" name="Chart 2"/>
-          <p:cNvGraphicFramePr/>
-          <p:nvPr>
-            <p:extLst>
-              <p:ext uri="{D42A27DB-BD31-4B8C-83A1-F6EECF244321}">
-                <p14:modId xmlns:p14="http://schemas.microsoft.com/office/powerpoint/2010/main" val="1256043303"/>
-              </p:ext>
-            </p:extLst>
-          </p:nvPr>
-        </p:nvGraphicFramePr>
-        <p:xfrm>
-          <a:off x="1401653" y="1663657"/>
-          <a:ext cx="5447881" cy="2218295"/>
-        </p:xfrm>
-        <a:graphic>
-          <a:graphicData uri="http://schemas.openxmlformats.org/drawingml/2006/chart">
-            <c:chart xmlns:c="http://schemas.openxmlformats.org/drawingml/2006/chart" xmlns:r="http://schemas.openxmlformats.org/officeDocument/2006/relationships" r:id="rId2"/>
-          </a:graphicData>
-        </a:graphic>
-      </p:graphicFrame>
-      <p:graphicFrame>
-        <p:nvGraphicFramePr>
-          <p:cNvPr id="20" name="Chart 19"/>
-          <p:cNvGraphicFramePr/>
-          <p:nvPr>
-            <p:extLst>
-              <p:ext uri="{D42A27DB-BD31-4B8C-83A1-F6EECF244321}">
-                <p14:modId xmlns:p14="http://schemas.microsoft.com/office/powerpoint/2010/main" val="1108150868"/>
-              </p:ext>
-            </p:extLst>
-          </p:nvPr>
-        </p:nvGraphicFramePr>
-        <p:xfrm>
-          <a:off x="1410120" y="2777055"/>
-          <a:ext cx="5439415" cy="1769541"/>
-        </p:xfrm>
-        <a:graphic>
-          <a:graphicData uri="http://schemas.openxmlformats.org/drawingml/2006/chart">
-            <c:chart xmlns:c="http://schemas.openxmlformats.org/drawingml/2006/chart" xmlns:r="http://schemas.openxmlformats.org/officeDocument/2006/relationships" r:id="rId3"/>
-          </a:graphicData>
-        </a:graphic>
-      </p:graphicFrame>
       <p:sp>
         <p:nvSpPr>
           <p:cNvPr id="4" name="Title 1"/>
@@ -17452,155 +16366,6 @@
                 <a:cs typeface="Times New Roman" panose="02020603050405020304" pitchFamily="18" charset="0"/>
               </a:rPr>
               <a:t>“</a:t>
-            </a:r>
-            <a:r>
-              <a:rPr lang="en-US" sz="1200" i="1" dirty="0" smtClean="0">
-                <a:solidFill>
-                  <a:schemeClr val="tx1"/>
-                </a:solidFill>
-                <a:latin typeface="Times New Roman" panose="02020603050405020304" pitchFamily="18" charset="0"/>
-                <a:cs typeface="Times New Roman" panose="02020603050405020304" pitchFamily="18" charset="0"/>
-              </a:rPr>
-              <a:t>Debt Consolidation </a:t>
-            </a:r>
-            <a:r>
-              <a:rPr lang="en-US" sz="1200" i="1" dirty="0" smtClean="0">
-                <a:solidFill>
-                  <a:schemeClr val="tx1"/>
-                </a:solidFill>
-                <a:latin typeface="Times New Roman" panose="02020603050405020304" pitchFamily="18" charset="0"/>
-                <a:cs typeface="Times New Roman" panose="02020603050405020304" pitchFamily="18" charset="0"/>
-              </a:rPr>
-              <a:t>captured to be a </a:t>
-            </a:r>
-            <a:r>
-              <a:rPr lang="en-US" sz="1200" i="1" dirty="0" smtClean="0">
-                <a:solidFill>
-                  <a:schemeClr val="tx1"/>
-                </a:solidFill>
-                <a:latin typeface="Times New Roman" panose="02020603050405020304" pitchFamily="18" charset="0"/>
-                <a:cs typeface="Times New Roman" panose="02020603050405020304" pitchFamily="18" charset="0"/>
-              </a:rPr>
-              <a:t>very common purpose for </a:t>
-            </a:r>
-            <a:r>
-              <a:rPr lang="en-US" sz="1200" i="1" dirty="0" smtClean="0">
-                <a:solidFill>
-                  <a:schemeClr val="tx1"/>
-                </a:solidFill>
-                <a:latin typeface="Times New Roman" panose="02020603050405020304" pitchFamily="18" charset="0"/>
-                <a:cs typeface="Times New Roman" panose="02020603050405020304" pitchFamily="18" charset="0"/>
-              </a:rPr>
-              <a:t>Loan Application</a:t>
-            </a:r>
-            <a:r>
-              <a:rPr lang="en-US" sz="1200" i="1" dirty="0" smtClean="0">
-                <a:solidFill>
-                  <a:schemeClr val="tx1"/>
-                </a:solidFill>
-                <a:latin typeface="Times New Roman" panose="02020603050405020304" pitchFamily="18" charset="0"/>
-                <a:cs typeface="Times New Roman" panose="02020603050405020304" pitchFamily="18" charset="0"/>
-              </a:rPr>
-              <a:t>. </a:t>
-            </a:r>
-            <a:r>
-              <a:rPr lang="en-US" sz="1200" i="1" dirty="0" smtClean="0">
-                <a:solidFill>
-                  <a:schemeClr val="tx1"/>
-                </a:solidFill>
-                <a:latin typeface="Times New Roman" panose="02020603050405020304" pitchFamily="18" charset="0"/>
-                <a:cs typeface="Times New Roman" panose="02020603050405020304" pitchFamily="18" charset="0"/>
-              </a:rPr>
-              <a:t>However, applicants opting for a Loan Term of </a:t>
-            </a:r>
-            <a:r>
-              <a:rPr lang="en-US" sz="1200" b="1" i="1" dirty="0" smtClean="0">
-                <a:solidFill>
-                  <a:schemeClr val="tx1"/>
-                </a:solidFill>
-                <a:latin typeface="Times New Roman" panose="02020603050405020304" pitchFamily="18" charset="0"/>
-                <a:cs typeface="Times New Roman" panose="02020603050405020304" pitchFamily="18" charset="0"/>
-              </a:rPr>
-              <a:t>60 Months </a:t>
-            </a:r>
-            <a:r>
-              <a:rPr lang="en-US" sz="1200" i="1" dirty="0" smtClean="0">
-                <a:solidFill>
-                  <a:schemeClr val="tx1"/>
-                </a:solidFill>
-                <a:latin typeface="Times New Roman" panose="02020603050405020304" pitchFamily="18" charset="0"/>
-                <a:cs typeface="Times New Roman" panose="02020603050405020304" pitchFamily="18" charset="0"/>
-              </a:rPr>
-              <a:t>have higher chances </a:t>
-            </a:r>
-            <a:r>
-              <a:rPr lang="en-US" sz="1200" i="1" dirty="0" smtClean="0">
-                <a:solidFill>
-                  <a:schemeClr val="tx1"/>
-                </a:solidFill>
-                <a:latin typeface="Times New Roman" panose="02020603050405020304" pitchFamily="18" charset="0"/>
-                <a:cs typeface="Times New Roman" panose="02020603050405020304" pitchFamily="18" charset="0"/>
-              </a:rPr>
-              <a:t>of getting at </a:t>
-            </a:r>
-            <a:r>
-              <a:rPr lang="en-US" sz="1200" i="1" dirty="0" smtClean="0">
-                <a:solidFill>
-                  <a:schemeClr val="tx1"/>
-                </a:solidFill>
-                <a:latin typeface="Times New Roman" panose="02020603050405020304" pitchFamily="18" charset="0"/>
-                <a:cs typeface="Times New Roman" panose="02020603050405020304" pitchFamily="18" charset="0"/>
-              </a:rPr>
-              <a:t>default. Also, when looked at the Verification Status, majority of the Applicant were found Verified for the same term. </a:t>
-            </a:r>
-            <a:r>
-              <a:rPr lang="en-US" sz="1200" b="1" i="1" dirty="0">
-                <a:solidFill>
-                  <a:schemeClr val="tx1"/>
-                </a:solidFill>
-                <a:latin typeface="Times New Roman" panose="02020603050405020304" pitchFamily="18" charset="0"/>
-                <a:cs typeface="Times New Roman" panose="02020603050405020304" pitchFamily="18" charset="0"/>
-              </a:rPr>
-              <a:t>Consumer Finance </a:t>
-            </a:r>
-            <a:r>
-              <a:rPr lang="en-US" sz="1200" b="1" i="1" dirty="0" smtClean="0">
-                <a:solidFill>
-                  <a:schemeClr val="tx1"/>
-                </a:solidFill>
-                <a:latin typeface="Times New Roman" panose="02020603050405020304" pitchFamily="18" charset="0"/>
-                <a:cs typeface="Times New Roman" panose="02020603050405020304" pitchFamily="18" charset="0"/>
-              </a:rPr>
-              <a:t>Company </a:t>
-            </a:r>
-            <a:r>
-              <a:rPr lang="en-US" sz="1200" i="1" dirty="0" smtClean="0">
-                <a:solidFill>
-                  <a:schemeClr val="tx1"/>
-                </a:solidFill>
-                <a:latin typeface="Times New Roman" panose="02020603050405020304" pitchFamily="18" charset="0"/>
-                <a:cs typeface="Times New Roman" panose="02020603050405020304" pitchFamily="18" charset="0"/>
-              </a:rPr>
-              <a:t>can scrutinize the verification process to understand specific trait of Borrower’s at default.”</a:t>
-            </a:r>
-            <a:endParaRPr lang="en-US" sz="1200" i="1" dirty="0" smtClean="0">
-              <a:solidFill>
-                <a:schemeClr val="tx1"/>
-              </a:solidFill>
-              <a:latin typeface="Times New Roman" panose="02020603050405020304" pitchFamily="18" charset="0"/>
-              <a:cs typeface="Times New Roman" panose="02020603050405020304" pitchFamily="18" charset="0"/>
-            </a:endParaRPr>
-          </a:p>
-          <a:p>
-            <a:r>
-              <a:rPr lang="en-US" sz="1200" dirty="0" smtClean="0">
-                <a:solidFill>
-                  <a:schemeClr val="tx1"/>
-                </a:solidFill>
-                <a:latin typeface="Times New Roman" panose="02020603050405020304" pitchFamily="18" charset="0"/>
-                <a:cs typeface="Times New Roman" panose="02020603050405020304" pitchFamily="18" charset="0"/>
-              </a:rPr>
-              <a:t>”</a:t>
             </a:r>
             <a:endParaRPr lang="en-US" sz="1200" dirty="0" smtClean="0">
               <a:solidFill>
@@ -17659,117 +16424,6 @@
           </a:p>
         </p:txBody>
       </p:sp>
-      <p:sp>
-        <p:nvSpPr>
-          <p:cNvPr id="11" name="TextBox 10"/>
-          <p:cNvSpPr txBox="1"/>
-          <p:nvPr/>
-        </p:nvSpPr>
-        <p:spPr>
-          <a:xfrm>
-            <a:off x="7061210" y="2066286"/>
-            <a:ext cx="4487334" cy="1200329"/>
-          </a:xfrm>
-          <a:prstGeom prst="rect">
-            <a:avLst/>
-          </a:prstGeom>
-          <a:noFill/>
-        </p:spPr>
-        <p:txBody>
-          <a:bodyPr wrap="square" rtlCol="0">
-            <a:spAutoFit/>
-          </a:bodyPr>
-          <a:lstStyle/>
-          <a:p>
-            <a:pPr marL="285750" indent="-285750">
-              <a:buFont typeface="Arial" panose="020B0604020202020204" pitchFamily="34" charset="0"/>
-              <a:buChar char="•"/>
-            </a:pPr>
-            <a:r>
-              <a:rPr lang="en-US" dirty="0" smtClean="0">
-                <a:latin typeface="Times New Roman" panose="02020603050405020304" pitchFamily="18" charset="0"/>
-                <a:cs typeface="Times New Roman" panose="02020603050405020304" pitchFamily="18" charset="0"/>
-              </a:rPr>
-              <a:t>It was observed that Applicants having </a:t>
-            </a:r>
-            <a:r>
-              <a:rPr lang="en-US" b="1" dirty="0" smtClean="0">
-                <a:latin typeface="Times New Roman" panose="02020603050405020304" pitchFamily="18" charset="0"/>
-                <a:cs typeface="Times New Roman" panose="02020603050405020304" pitchFamily="18" charset="0"/>
-              </a:rPr>
-              <a:t>Debt Consolidation</a:t>
-            </a:r>
-            <a:r>
-              <a:rPr lang="en-US" dirty="0" smtClean="0">
-                <a:latin typeface="Times New Roman" panose="02020603050405020304" pitchFamily="18" charset="0"/>
-                <a:cs typeface="Times New Roman" panose="02020603050405020304" pitchFamily="18" charset="0"/>
-              </a:rPr>
-              <a:t> as the purpose of Loan tends to default with a higher chance over a Loan Term of </a:t>
-            </a:r>
-            <a:r>
-              <a:rPr lang="en-US" b="1" dirty="0" smtClean="0">
-                <a:latin typeface="Times New Roman" panose="02020603050405020304" pitchFamily="18" charset="0"/>
-                <a:cs typeface="Times New Roman" panose="02020603050405020304" pitchFamily="18" charset="0"/>
-              </a:rPr>
-              <a:t>60 Months</a:t>
-            </a:r>
-          </a:p>
-        </p:txBody>
-      </p:sp>
-      <p:pic>
-        <p:nvPicPr>
-          <p:cNvPr id="2050" name="Picture 2"/>
-          <p:cNvPicPr>
-            <a:picLocks noChangeAspect="1" noChangeArrowheads="1"/>
-          </p:cNvPicPr>
-          <p:nvPr/>
-        </p:nvPicPr>
-        <p:blipFill>
-          <a:blip r:embed="rId4">
-            <a:extLst>
-              <a:ext uri="{28A0092B-C50C-407E-A947-70E740481C1C}">
-                <a14:useLocalDpi xmlns:a14="http://schemas.microsoft.com/office/drawing/2010/main" val="0"/>
-              </a:ext>
-            </a:extLst>
-          </a:blip>
-          <a:srcRect/>
-          <a:stretch>
-            <a:fillRect/>
-          </a:stretch>
-        </p:blipFill>
-        <p:spPr bwMode="auto">
-          <a:xfrm>
-            <a:off x="3402713" y="1681206"/>
-            <a:ext cx="1881385" cy="228285"/>
-          </a:xfrm>
-          <a:prstGeom prst="rect">
-            <a:avLst/>
-          </a:prstGeom>
-          <a:noFill/>
-          <a:ln>
-            <a:noFill/>
-          </a:ln>
-          <a:extLst>
-            <a:ext uri="{909E8E84-426E-40DD-AFC4-6F175D3DCCD1}">
-              <a14:hiddenFill xmlns:a14="http://schemas.microsoft.com/office/drawing/2010/main">
-                <a:solidFill>
-                  <a:schemeClr val="accent1"/>
-                </a:solidFill>
-              </a14:hiddenFill>
-            </a:ext>
-            <a:ext uri="{91240B29-F687-4F45-9708-019B960494DF}">
-              <a14:hiddenLine xmlns:a14="http://schemas.microsoft.com/office/drawing/2010/main" w="9525">
-                <a:solidFill>
-                  <a:schemeClr val="tx1"/>
-                </a:solidFill>
-                <a:miter lim="800000"/>
-                <a:headEnd/>
-                <a:tailEnd/>
-              </a14:hiddenLine>
-            </a:ext>
-          </a:extLst>
-        </p:spPr>
-      </p:pic>
       <p:pic>
         <p:nvPicPr>
           <p:cNvPr id="2052" name="Picture 4"/>
@@ -17779,7 +16433,7 @@
           <p:nvPr/>
         </p:nvPicPr>
         <p:blipFill>
-          <a:blip r:embed="rId5" cstate="print">
+          <a:blip r:embed="rId2" cstate="print">
             <a:extLst>
               <a:ext uri="{28A0092B-C50C-407E-A947-70E740481C1C}">
                 <a14:useLocalDpi xmlns:a14="http://schemas.microsoft.com/office/drawing/2010/main" val="0"/>
@@ -17860,756 +16514,6 @@
           </a:fontRef>
         </p:style>
       </p:cxnSp>
-      <p:sp>
-        <p:nvSpPr>
-          <p:cNvPr id="22" name="TextBox 21"/>
-          <p:cNvSpPr txBox="1"/>
-          <p:nvPr/>
-        </p:nvSpPr>
-        <p:spPr>
-          <a:xfrm>
-            <a:off x="2257467" y="1865912"/>
-            <a:ext cx="4269671" cy="461665"/>
-          </a:xfrm>
-          <a:prstGeom prst="rect">
-            <a:avLst/>
-          </a:prstGeom>
-          <a:noFill/>
-        </p:spPr>
-        <p:txBody>
-          <a:bodyPr wrap="square" rtlCol="0">
-            <a:spAutoFit/>
-          </a:bodyPr>
-          <a:lstStyle/>
-          <a:p>
-            <a:pPr algn="ctr"/>
-            <a:r>
-              <a:rPr lang="en-US" sz="1200" b="1" dirty="0" smtClean="0">
-                <a:latin typeface="Times New Roman" panose="02020603050405020304" pitchFamily="18" charset="0"/>
-                <a:cs typeface="Times New Roman" panose="02020603050405020304" pitchFamily="18" charset="0"/>
-              </a:rPr>
-              <a:t>Distribution of Loan Term across Top 6 Purpose Categories</a:t>
-            </a:r>
-            <a:endParaRPr lang="en-US" sz="1200" b="1" dirty="0">
-              <a:latin typeface="Times New Roman" panose="02020603050405020304" pitchFamily="18" charset="0"/>
-              <a:cs typeface="Times New Roman" panose="02020603050405020304" pitchFamily="18" charset="0"/>
-            </a:endParaRPr>
-          </a:p>
-        </p:txBody>
-      </p:sp>
-      <p:graphicFrame>
-        <p:nvGraphicFramePr>
-          <p:cNvPr id="24" name="Chart 23"/>
-          <p:cNvGraphicFramePr/>
-          <p:nvPr>
-            <p:extLst>
-              <p:ext uri="{D42A27DB-BD31-4B8C-83A1-F6EECF244321}">
-                <p14:modId xmlns:p14="http://schemas.microsoft.com/office/powerpoint/2010/main" val="1800359518"/>
-              </p:ext>
-            </p:extLst>
-          </p:nvPr>
-        </p:nvGraphicFramePr>
-        <p:xfrm>
-          <a:off x="1376252" y="4715933"/>
-          <a:ext cx="5642615" cy="1049897"/>
-        </p:xfrm>
-        <a:graphic>
-          <a:graphicData uri="http://schemas.openxmlformats.org/drawingml/2006/chart">
-            <c:chart xmlns:c="http://schemas.openxmlformats.org/drawingml/2006/chart" xmlns:r="http://schemas.openxmlformats.org/officeDocument/2006/relationships" r:id="rId6"/>
-          </a:graphicData>
-        </a:graphic>
-      </p:graphicFrame>
-      <p:graphicFrame>
-        <p:nvGraphicFramePr>
-          <p:cNvPr id="27" name="Chart 26"/>
-          <p:cNvGraphicFramePr/>
-          <p:nvPr>
-            <p:extLst>
-              <p:ext uri="{D42A27DB-BD31-4B8C-83A1-F6EECF244321}">
-                <p14:modId xmlns:p14="http://schemas.microsoft.com/office/powerpoint/2010/main" val="703216518"/>
-              </p:ext>
-            </p:extLst>
-          </p:nvPr>
-        </p:nvGraphicFramePr>
-        <p:xfrm>
-          <a:off x="1376252" y="4292175"/>
-          <a:ext cx="5642615" cy="743701"/>
-        </p:xfrm>
-        <a:graphic>
-          <a:graphicData uri="http://schemas.openxmlformats.org/drawingml/2006/chart">
-            <c:chart xmlns:c="http://schemas.openxmlformats.org/drawingml/2006/chart" xmlns:r="http://schemas.openxmlformats.org/officeDocument/2006/relationships" r:id="rId7"/>
-          </a:graphicData>
-        </a:graphic>
-      </p:graphicFrame>
-      <p:sp>
-        <p:nvSpPr>
-          <p:cNvPr id="28" name="TextBox 27"/>
-          <p:cNvSpPr txBox="1"/>
-          <p:nvPr/>
-        </p:nvSpPr>
-        <p:spPr>
-          <a:xfrm>
-            <a:off x="2632209" y="4199673"/>
-            <a:ext cx="3782675" cy="461665"/>
-          </a:xfrm>
-          <a:prstGeom prst="rect">
-            <a:avLst/>
-          </a:prstGeom>
-          <a:noFill/>
-        </p:spPr>
-        <p:txBody>
-          <a:bodyPr wrap="square" rtlCol="0">
-            <a:spAutoFit/>
-          </a:bodyPr>
-          <a:lstStyle/>
-          <a:p>
-            <a:r>
-              <a:rPr lang="en-US" sz="1200" b="1" dirty="0" smtClean="0">
-                <a:latin typeface="Times New Roman" panose="02020603050405020304" pitchFamily="18" charset="0"/>
-                <a:cs typeface="Times New Roman" panose="02020603050405020304" pitchFamily="18" charset="0"/>
-              </a:rPr>
-              <a:t>Distribution of Loan Term across Verification Status</a:t>
-            </a:r>
-            <a:endParaRPr lang="en-US" sz="1200" b="1" dirty="0">
-              <a:latin typeface="Times New Roman" panose="02020603050405020304" pitchFamily="18" charset="0"/>
-              <a:cs typeface="Times New Roman" panose="02020603050405020304" pitchFamily="18" charset="0"/>
-            </a:endParaRPr>
-          </a:p>
-        </p:txBody>
-      </p:sp>
-      <p:sp>
-        <p:nvSpPr>
-          <p:cNvPr id="29" name="TextBox 28"/>
-          <p:cNvSpPr txBox="1"/>
-          <p:nvPr/>
-        </p:nvSpPr>
-        <p:spPr>
-          <a:xfrm>
-            <a:off x="1961482" y="3746986"/>
-            <a:ext cx="547626" cy="400110"/>
-          </a:xfrm>
-          <a:prstGeom prst="rect">
-            <a:avLst/>
-          </a:prstGeom>
-          <a:noFill/>
-        </p:spPr>
-        <p:txBody>
-          <a:bodyPr wrap="square" rtlCol="0">
-            <a:spAutoFit/>
-          </a:bodyPr>
-          <a:lstStyle/>
-          <a:p>
-            <a:pPr algn="ctr"/>
-            <a:r>
-              <a:rPr lang="en-US" sz="1000" dirty="0" smtClean="0">
-                <a:latin typeface="Times New Roman" panose="02020603050405020304" pitchFamily="18" charset="0"/>
-                <a:cs typeface="Times New Roman" panose="02020603050405020304" pitchFamily="18" charset="0"/>
-              </a:rPr>
-              <a:t>Credit Card</a:t>
-            </a:r>
-            <a:endParaRPr lang="en-US" sz="1000" dirty="0">
-              <a:latin typeface="Times New Roman" panose="02020603050405020304" pitchFamily="18" charset="0"/>
-              <a:cs typeface="Times New Roman" panose="02020603050405020304" pitchFamily="18" charset="0"/>
-            </a:endParaRPr>
-          </a:p>
-        </p:txBody>
-      </p:sp>
-      <p:sp>
-        <p:nvSpPr>
-          <p:cNvPr id="31" name="TextBox 30"/>
-          <p:cNvSpPr txBox="1"/>
-          <p:nvPr/>
-        </p:nvSpPr>
-        <p:spPr>
-          <a:xfrm>
-            <a:off x="2450250" y="3756603"/>
-            <a:ext cx="970154" cy="416227"/>
-          </a:xfrm>
-          <a:prstGeom prst="rect">
-            <a:avLst/>
-          </a:prstGeom>
-          <a:noFill/>
-        </p:spPr>
-        <p:txBody>
-          <a:bodyPr wrap="square" rtlCol="0">
-            <a:spAutoFit/>
-          </a:bodyPr>
-          <a:lstStyle/>
-          <a:p>
-            <a:pPr algn="ctr"/>
-            <a:r>
-              <a:rPr lang="en-US" sz="1000" dirty="0" smtClean="0">
-                <a:latin typeface="Times New Roman" panose="02020603050405020304" pitchFamily="18" charset="0"/>
-                <a:cs typeface="Times New Roman" panose="02020603050405020304" pitchFamily="18" charset="0"/>
-              </a:rPr>
-              <a:t>Debt Consolidation</a:t>
-            </a:r>
-            <a:endParaRPr lang="en-US" sz="1000" dirty="0">
-              <a:latin typeface="Times New Roman" panose="02020603050405020304" pitchFamily="18" charset="0"/>
-              <a:cs typeface="Times New Roman" panose="02020603050405020304" pitchFamily="18" charset="0"/>
-            </a:endParaRPr>
-          </a:p>
-        </p:txBody>
-      </p:sp>
-      <p:sp>
-        <p:nvSpPr>
-          <p:cNvPr id="32" name="TextBox 31"/>
-          <p:cNvSpPr txBox="1"/>
-          <p:nvPr/>
-        </p:nvSpPr>
-        <p:spPr>
-          <a:xfrm>
-            <a:off x="3223174" y="3753540"/>
-            <a:ext cx="891624" cy="400110"/>
-          </a:xfrm>
-          <a:prstGeom prst="rect">
-            <a:avLst/>
-          </a:prstGeom>
-          <a:noFill/>
-        </p:spPr>
-        <p:txBody>
-          <a:bodyPr wrap="square" rtlCol="0">
-            <a:spAutoFit/>
-          </a:bodyPr>
-          <a:lstStyle/>
-          <a:p>
-            <a:pPr algn="ctr"/>
-            <a:r>
-              <a:rPr lang="en-US" sz="1000" dirty="0" smtClean="0">
-                <a:latin typeface="Times New Roman" panose="02020603050405020304" pitchFamily="18" charset="0"/>
-                <a:cs typeface="Times New Roman" panose="02020603050405020304" pitchFamily="18" charset="0"/>
-              </a:rPr>
-              <a:t>Home Improvement</a:t>
-            </a:r>
-            <a:endParaRPr lang="en-US" sz="1000" dirty="0">
-              <a:latin typeface="Times New Roman" panose="02020603050405020304" pitchFamily="18" charset="0"/>
-              <a:cs typeface="Times New Roman" panose="02020603050405020304" pitchFamily="18" charset="0"/>
-            </a:endParaRPr>
-          </a:p>
-        </p:txBody>
-      </p:sp>
-      <p:sp>
-        <p:nvSpPr>
-          <p:cNvPr id="33" name="TextBox 32"/>
-          <p:cNvSpPr txBox="1"/>
-          <p:nvPr/>
-        </p:nvSpPr>
-        <p:spPr>
-          <a:xfrm>
-            <a:off x="4018465" y="3745326"/>
-            <a:ext cx="773667" cy="400110"/>
-          </a:xfrm>
-          <a:prstGeom prst="rect">
-            <a:avLst/>
-          </a:prstGeom>
-          <a:noFill/>
-        </p:spPr>
-        <p:txBody>
-          <a:bodyPr wrap="square" rtlCol="0">
-            <a:spAutoFit/>
-          </a:bodyPr>
-          <a:lstStyle/>
-          <a:p>
-            <a:pPr algn="ctr"/>
-            <a:r>
-              <a:rPr lang="en-US" sz="1000" dirty="0" smtClean="0">
-                <a:latin typeface="Times New Roman" panose="02020603050405020304" pitchFamily="18" charset="0"/>
-                <a:cs typeface="Times New Roman" panose="02020603050405020304" pitchFamily="18" charset="0"/>
-              </a:rPr>
-              <a:t>Major Purchase</a:t>
-            </a:r>
-            <a:endParaRPr lang="en-US" sz="1000" dirty="0">
-              <a:latin typeface="Times New Roman" panose="02020603050405020304" pitchFamily="18" charset="0"/>
-              <a:cs typeface="Times New Roman" panose="02020603050405020304" pitchFamily="18" charset="0"/>
-            </a:endParaRPr>
-          </a:p>
-        </p:txBody>
-      </p:sp>
-      <p:sp>
-        <p:nvSpPr>
-          <p:cNvPr id="34" name="TextBox 33"/>
-          <p:cNvSpPr txBox="1"/>
-          <p:nvPr/>
-        </p:nvSpPr>
-        <p:spPr>
-          <a:xfrm>
-            <a:off x="4809954" y="3762260"/>
-            <a:ext cx="528425" cy="246221"/>
-          </a:xfrm>
-          <a:prstGeom prst="rect">
-            <a:avLst/>
-          </a:prstGeom>
-          <a:noFill/>
-        </p:spPr>
-        <p:txBody>
-          <a:bodyPr wrap="square" rtlCol="0">
-            <a:spAutoFit/>
-          </a:bodyPr>
-          <a:lstStyle/>
-          <a:p>
-            <a:pPr algn="ctr"/>
-            <a:r>
-              <a:rPr lang="en-US" sz="1000" dirty="0" smtClean="0">
-                <a:latin typeface="Times New Roman" panose="02020603050405020304" pitchFamily="18" charset="0"/>
-                <a:cs typeface="Times New Roman" panose="02020603050405020304" pitchFamily="18" charset="0"/>
-              </a:rPr>
-              <a:t>Other</a:t>
-            </a:r>
-            <a:endParaRPr lang="en-US" sz="1000" dirty="0">
-              <a:latin typeface="Times New Roman" panose="02020603050405020304" pitchFamily="18" charset="0"/>
-              <a:cs typeface="Times New Roman" panose="02020603050405020304" pitchFamily="18" charset="0"/>
-            </a:endParaRPr>
-          </a:p>
-        </p:txBody>
-      </p:sp>
-      <p:sp>
-        <p:nvSpPr>
-          <p:cNvPr id="35" name="TextBox 34"/>
-          <p:cNvSpPr txBox="1"/>
-          <p:nvPr/>
-        </p:nvSpPr>
-        <p:spPr>
-          <a:xfrm>
-            <a:off x="5404535" y="3753793"/>
-            <a:ext cx="771418" cy="400110"/>
-          </a:xfrm>
-          <a:prstGeom prst="rect">
-            <a:avLst/>
-          </a:prstGeom>
-          <a:noFill/>
-        </p:spPr>
-        <p:txBody>
-          <a:bodyPr wrap="square" rtlCol="0">
-            <a:spAutoFit/>
-          </a:bodyPr>
-          <a:lstStyle/>
-          <a:p>
-            <a:pPr algn="ctr"/>
-            <a:r>
-              <a:rPr lang="en-US" sz="1000" dirty="0" smtClean="0">
-                <a:latin typeface="Times New Roman" panose="02020603050405020304" pitchFamily="18" charset="0"/>
-                <a:cs typeface="Times New Roman" panose="02020603050405020304" pitchFamily="18" charset="0"/>
-              </a:rPr>
-              <a:t>Other Categories</a:t>
-            </a:r>
-            <a:endParaRPr lang="en-US" sz="1000" dirty="0">
-              <a:latin typeface="Times New Roman" panose="02020603050405020304" pitchFamily="18" charset="0"/>
-              <a:cs typeface="Times New Roman" panose="02020603050405020304" pitchFamily="18" charset="0"/>
-            </a:endParaRPr>
-          </a:p>
-        </p:txBody>
-      </p:sp>
-      <p:sp>
-        <p:nvSpPr>
-          <p:cNvPr id="36" name="TextBox 35"/>
-          <p:cNvSpPr txBox="1"/>
-          <p:nvPr/>
-        </p:nvSpPr>
-        <p:spPr>
-          <a:xfrm>
-            <a:off x="6133303" y="3763920"/>
-            <a:ext cx="771418" cy="400110"/>
-          </a:xfrm>
-          <a:prstGeom prst="rect">
-            <a:avLst/>
-          </a:prstGeom>
-          <a:noFill/>
-        </p:spPr>
-        <p:txBody>
-          <a:bodyPr wrap="square" rtlCol="0">
-            <a:spAutoFit/>
-          </a:bodyPr>
-          <a:lstStyle/>
-          <a:p>
-            <a:pPr algn="ctr"/>
-            <a:r>
-              <a:rPr lang="en-US" sz="1000" dirty="0" smtClean="0">
-                <a:latin typeface="Times New Roman" panose="02020603050405020304" pitchFamily="18" charset="0"/>
-                <a:cs typeface="Times New Roman" panose="02020603050405020304" pitchFamily="18" charset="0"/>
-              </a:rPr>
-              <a:t>Small Business</a:t>
-            </a:r>
-            <a:endParaRPr lang="en-US" sz="1000" dirty="0">
-              <a:latin typeface="Times New Roman" panose="02020603050405020304" pitchFamily="18" charset="0"/>
-              <a:cs typeface="Times New Roman" panose="02020603050405020304" pitchFamily="18" charset="0"/>
-            </a:endParaRPr>
-          </a:p>
-        </p:txBody>
-      </p:sp>
-      <p:pic>
-        <p:nvPicPr>
-          <p:cNvPr id="3074" name="Picture 2"/>
-          <p:cNvPicPr>
-            <a:picLocks noChangeAspect="1" noChangeArrowheads="1"/>
-          </p:cNvPicPr>
-          <p:nvPr/>
-        </p:nvPicPr>
-        <p:blipFill>
-          <a:blip r:embed="rId8">
-            <a:extLst>
-              <a:ext uri="{28A0092B-C50C-407E-A947-70E740481C1C}">
-                <a14:useLocalDpi xmlns:a14="http://schemas.microsoft.com/office/drawing/2010/main" val="0"/>
-              </a:ext>
-            </a:extLst>
-          </a:blip>
-          <a:srcRect/>
-          <a:stretch>
-            <a:fillRect/>
-          </a:stretch>
-        </p:blipFill>
-        <p:spPr bwMode="auto">
-          <a:xfrm>
-            <a:off x="1136311" y="4025586"/>
-            <a:ext cx="701315" cy="393595"/>
-          </a:xfrm>
-          <a:prstGeom prst="rect">
-            <a:avLst/>
-          </a:prstGeom>
-          <a:noFill/>
-          <a:ln>
-            <a:noFill/>
-          </a:ln>
-          <a:extLst>
-            <a:ext uri="{909E8E84-426E-40DD-AFC4-6F175D3DCCD1}">
-              <a14:hiddenFill xmlns:a14="http://schemas.microsoft.com/office/drawing/2010/main">
-                <a:solidFill>
-                  <a:schemeClr val="accent1"/>
-                </a:solidFill>
-              </a14:hiddenFill>
-            </a:ext>
-            <a:ext uri="{91240B29-F687-4F45-9708-019B960494DF}">
-              <a14:hiddenLine xmlns:a14="http://schemas.microsoft.com/office/drawing/2010/main" w="9525">
-                <a:solidFill>
-                  <a:schemeClr val="tx1"/>
-                </a:solidFill>
-                <a:miter lim="800000"/>
-                <a:headEnd/>
-                <a:tailEnd/>
-              </a14:hiddenLine>
-            </a:ext>
-          </a:extLst>
-        </p:spPr>
-      </p:pic>
-      <p:pic>
-        <p:nvPicPr>
-          <p:cNvPr id="3075" name="Picture 3"/>
-          <p:cNvPicPr>
-            <a:picLocks noChangeAspect="1" noChangeArrowheads="1"/>
-          </p:cNvPicPr>
-          <p:nvPr/>
-        </p:nvPicPr>
-        <p:blipFill>
-          <a:blip r:embed="rId9">
-            <a:extLst>
-              <a:ext uri="{28A0092B-C50C-407E-A947-70E740481C1C}">
-                <a14:useLocalDpi xmlns:a14="http://schemas.microsoft.com/office/drawing/2010/main" val="0"/>
-              </a:ext>
-            </a:extLst>
-          </a:blip>
-          <a:srcRect/>
-          <a:stretch>
-            <a:fillRect/>
-          </a:stretch>
-        </p:blipFill>
-        <p:spPr bwMode="auto">
-          <a:xfrm>
-            <a:off x="1143417" y="3508338"/>
-            <a:ext cx="744252" cy="379283"/>
-          </a:xfrm>
-          <a:prstGeom prst="rect">
-            <a:avLst/>
-          </a:prstGeom>
-          <a:noFill/>
-          <a:ln>
-            <a:noFill/>
-          </a:ln>
-          <a:extLst>
-            <a:ext uri="{909E8E84-426E-40DD-AFC4-6F175D3DCCD1}">
-              <a14:hiddenFill xmlns:a14="http://schemas.microsoft.com/office/drawing/2010/main">
-                <a:solidFill>
-                  <a:schemeClr val="accent1"/>
-                </a:solidFill>
-              </a14:hiddenFill>
-            </a:ext>
-            <a:ext uri="{91240B29-F687-4F45-9708-019B960494DF}">
-              <a14:hiddenLine xmlns:a14="http://schemas.microsoft.com/office/drawing/2010/main" w="9525">
-                <a:solidFill>
-                  <a:schemeClr val="tx1"/>
-                </a:solidFill>
-                <a:miter lim="800000"/>
-                <a:headEnd/>
-                <a:tailEnd/>
-              </a14:hiddenLine>
-            </a:ext>
-          </a:extLst>
-        </p:spPr>
-      </p:pic>
-      <p:sp>
-        <p:nvSpPr>
-          <p:cNvPr id="25" name="Rounded Rectangle 24"/>
-          <p:cNvSpPr/>
-          <p:nvPr/>
-        </p:nvSpPr>
-        <p:spPr>
-          <a:xfrm>
-            <a:off x="5562600" y="4514996"/>
-            <a:ext cx="1244600" cy="1124193"/>
-          </a:xfrm>
-          <a:prstGeom prst="roundRect">
-            <a:avLst/>
-          </a:prstGeom>
-          <a:noFill/>
-          <a:ln w="19050">
-            <a:solidFill>
-              <a:srgbClr val="A73719"/>
-            </a:solidFill>
-            <a:prstDash val="sysDash"/>
-          </a:ln>
-        </p:spPr>
-        <p:style>
-          <a:lnRef idx="2">
-            <a:schemeClr val="accent6">
-              <a:shade val="50000"/>
-            </a:schemeClr>
-          </a:lnRef>
-          <a:fillRef idx="1">
-            <a:schemeClr val="accent6"/>
-          </a:fillRef>
-          <a:effectRef idx="0">
-            <a:schemeClr val="accent6"/>
-          </a:effectRef>
-          <a:fontRef idx="minor">
-            <a:schemeClr val="lt1"/>
-          </a:fontRef>
-        </p:style>
-        <p:txBody>
-          <a:bodyPr rtlCol="0" anchor="ctr"/>
-          <a:lstStyle/>
-          <a:p>
-            <a:pPr algn="ctr"/>
-            <a:endParaRPr lang="en-US" dirty="0"/>
-          </a:p>
-        </p:txBody>
-      </p:sp>
-      <p:sp>
-        <p:nvSpPr>
-          <p:cNvPr id="30" name="TextBox 29"/>
-          <p:cNvSpPr txBox="1"/>
-          <p:nvPr/>
-        </p:nvSpPr>
-        <p:spPr>
-          <a:xfrm>
-            <a:off x="3864340" y="5637935"/>
-            <a:ext cx="1132726" cy="205319"/>
-          </a:xfrm>
-          <a:prstGeom prst="rect">
-            <a:avLst/>
-          </a:prstGeom>
-          <a:noFill/>
-        </p:spPr>
-        <p:txBody>
-          <a:bodyPr wrap="square" rtlCol="0">
-            <a:spAutoFit/>
-          </a:bodyPr>
-          <a:lstStyle/>
-          <a:p>
-            <a:pPr algn="ctr"/>
-            <a:r>
-              <a:rPr lang="en-US" sz="1000" dirty="0" smtClean="0">
-                <a:latin typeface="Times New Roman" panose="02020603050405020304" pitchFamily="18" charset="0"/>
-                <a:cs typeface="Times New Roman" panose="02020603050405020304" pitchFamily="18" charset="0"/>
-              </a:rPr>
-              <a:t>Source Verified</a:t>
-            </a:r>
-            <a:endParaRPr lang="en-US" sz="1000" dirty="0">
-              <a:latin typeface="Times New Roman" panose="02020603050405020304" pitchFamily="18" charset="0"/>
-              <a:cs typeface="Times New Roman" panose="02020603050405020304" pitchFamily="18" charset="0"/>
-            </a:endParaRPr>
-          </a:p>
-        </p:txBody>
-      </p:sp>
-      <p:sp>
-        <p:nvSpPr>
-          <p:cNvPr id="37" name="TextBox 36"/>
-          <p:cNvSpPr txBox="1"/>
-          <p:nvPr/>
-        </p:nvSpPr>
-        <p:spPr>
-          <a:xfrm>
-            <a:off x="2267533" y="5639189"/>
-            <a:ext cx="936137" cy="246221"/>
-          </a:xfrm>
-          <a:prstGeom prst="rect">
-            <a:avLst/>
-          </a:prstGeom>
-          <a:noFill/>
-        </p:spPr>
-        <p:txBody>
-          <a:bodyPr wrap="square" rtlCol="0">
-            <a:spAutoFit/>
-          </a:bodyPr>
-          <a:lstStyle/>
-          <a:p>
-            <a:pPr algn="ctr"/>
-            <a:r>
-              <a:rPr lang="en-US" sz="1000" dirty="0" smtClean="0">
-                <a:latin typeface="Times New Roman" panose="02020603050405020304" pitchFamily="18" charset="0"/>
-                <a:cs typeface="Times New Roman" panose="02020603050405020304" pitchFamily="18" charset="0"/>
-              </a:rPr>
-              <a:t>Not Verified</a:t>
-            </a:r>
-            <a:endParaRPr lang="en-US" sz="1000" dirty="0">
-              <a:latin typeface="Times New Roman" panose="02020603050405020304" pitchFamily="18" charset="0"/>
-              <a:cs typeface="Times New Roman" panose="02020603050405020304" pitchFamily="18" charset="0"/>
-            </a:endParaRPr>
-          </a:p>
-        </p:txBody>
-      </p:sp>
-      <p:sp>
-        <p:nvSpPr>
-          <p:cNvPr id="38" name="TextBox 37"/>
-          <p:cNvSpPr txBox="1"/>
-          <p:nvPr/>
-        </p:nvSpPr>
-        <p:spPr>
-          <a:xfrm>
-            <a:off x="5800845" y="5637934"/>
-            <a:ext cx="703334" cy="246221"/>
-          </a:xfrm>
-          <a:prstGeom prst="rect">
-            <a:avLst/>
-          </a:prstGeom>
-          <a:noFill/>
-        </p:spPr>
-        <p:txBody>
-          <a:bodyPr wrap="square" rtlCol="0">
-            <a:spAutoFit/>
-          </a:bodyPr>
-          <a:lstStyle/>
-          <a:p>
-            <a:pPr algn="ctr"/>
-            <a:r>
-              <a:rPr lang="en-US" sz="1000" dirty="0" smtClean="0">
-                <a:latin typeface="Times New Roman" panose="02020603050405020304" pitchFamily="18" charset="0"/>
-                <a:cs typeface="Times New Roman" panose="02020603050405020304" pitchFamily="18" charset="0"/>
-              </a:rPr>
-              <a:t>Verified</a:t>
-            </a:r>
-            <a:endParaRPr lang="en-US" sz="1000" dirty="0">
-              <a:latin typeface="Times New Roman" panose="02020603050405020304" pitchFamily="18" charset="0"/>
-              <a:cs typeface="Times New Roman" panose="02020603050405020304" pitchFamily="18" charset="0"/>
-            </a:endParaRPr>
-          </a:p>
-        </p:txBody>
-      </p:sp>
-      <p:sp>
-        <p:nvSpPr>
-          <p:cNvPr id="39" name="Rounded Rectangle 38"/>
-          <p:cNvSpPr/>
-          <p:nvPr/>
-        </p:nvSpPr>
-        <p:spPr>
-          <a:xfrm>
-            <a:off x="2615989" y="2097494"/>
-            <a:ext cx="638676" cy="1645930"/>
-          </a:xfrm>
-          <a:prstGeom prst="roundRect">
-            <a:avLst/>
-          </a:prstGeom>
-          <a:noFill/>
-          <a:ln w="19050">
-            <a:solidFill>
-              <a:srgbClr val="A73719"/>
-            </a:solidFill>
-            <a:prstDash val="sysDash"/>
-          </a:ln>
-        </p:spPr>
-        <p:style>
-          <a:lnRef idx="2">
-            <a:schemeClr val="accent6">
-              <a:shade val="50000"/>
-            </a:schemeClr>
-          </a:lnRef>
-          <a:fillRef idx="1">
-            <a:schemeClr val="accent6"/>
-          </a:fillRef>
-          <a:effectRef idx="0">
-            <a:schemeClr val="accent6"/>
-          </a:effectRef>
-          <a:fontRef idx="minor">
-            <a:schemeClr val="lt1"/>
-          </a:fontRef>
-        </p:style>
-        <p:txBody>
-          <a:bodyPr rtlCol="0" anchor="ctr"/>
-          <a:lstStyle/>
-          <a:p>
-            <a:pPr algn="ctr"/>
-            <a:endParaRPr lang="en-US" dirty="0"/>
-          </a:p>
-        </p:txBody>
-      </p:sp>
-      <p:sp>
-        <p:nvSpPr>
-          <p:cNvPr id="40" name="TextBox 39"/>
-          <p:cNvSpPr txBox="1"/>
-          <p:nvPr/>
-        </p:nvSpPr>
-        <p:spPr>
-          <a:xfrm>
-            <a:off x="7027257" y="4430652"/>
-            <a:ext cx="4191078" cy="1200329"/>
-          </a:xfrm>
-          <a:prstGeom prst="rect">
-            <a:avLst/>
-          </a:prstGeom>
-          <a:noFill/>
-        </p:spPr>
-        <p:txBody>
-          <a:bodyPr wrap="square" rtlCol="0">
-            <a:spAutoFit/>
-          </a:bodyPr>
-          <a:lstStyle/>
-          <a:p>
-            <a:pPr marL="285750" indent="-285750">
-              <a:buFont typeface="Arial" panose="020B0604020202020204" pitchFamily="34" charset="0"/>
-              <a:buChar char="•"/>
-            </a:pPr>
-            <a:r>
-              <a:rPr lang="en-US" dirty="0" smtClean="0">
-                <a:latin typeface="Times New Roman" panose="02020603050405020304" pitchFamily="18" charset="0"/>
-                <a:cs typeface="Times New Roman" panose="02020603050405020304" pitchFamily="18" charset="0"/>
-              </a:rPr>
-              <a:t>Applicants whose Verification Status showed </a:t>
-            </a:r>
-            <a:r>
-              <a:rPr lang="en-US" b="1" dirty="0" smtClean="0">
-                <a:latin typeface="Times New Roman" panose="02020603050405020304" pitchFamily="18" charset="0"/>
-                <a:cs typeface="Times New Roman" panose="02020603050405020304" pitchFamily="18" charset="0"/>
-              </a:rPr>
-              <a:t>Verified </a:t>
-            </a:r>
-            <a:r>
-              <a:rPr lang="en-US" dirty="0" smtClean="0">
-                <a:latin typeface="Times New Roman" panose="02020603050405020304" pitchFamily="18" charset="0"/>
-                <a:cs typeface="Times New Roman" panose="02020603050405020304" pitchFamily="18" charset="0"/>
-              </a:rPr>
-              <a:t>were captured more in the Charged off list for the Loan Term of </a:t>
-            </a:r>
-            <a:r>
-              <a:rPr lang="en-US" b="1" dirty="0" smtClean="0">
-                <a:latin typeface="Times New Roman" panose="02020603050405020304" pitchFamily="18" charset="0"/>
-                <a:cs typeface="Times New Roman" panose="02020603050405020304" pitchFamily="18" charset="0"/>
-              </a:rPr>
-              <a:t>60 Months</a:t>
-            </a:r>
-            <a:endParaRPr lang="en-US" b="1" dirty="0" smtClean="0">
-              <a:latin typeface="Times New Roman" panose="02020603050405020304" pitchFamily="18" charset="0"/>
-              <a:cs typeface="Times New Roman" panose="02020603050405020304" pitchFamily="18" charset="0"/>
-            </a:endParaRPr>
-          </a:p>
-        </p:txBody>
-      </p:sp>
     </p:spTree>
     <p:extLst>
       <p:ext uri="{BB962C8B-B14F-4D97-AF65-F5344CB8AC3E}">

</xml_diff>